<commit_message>
updated copy icon for better 16x16 result
</commit_message>
<xml_diff>
--- a/graphics/graphics.pptx
+++ b/graphics/graphics.pptx
@@ -6,7 +6,7 @@
     <p:sldMasterId id="2147483660" r:id="rId2"/>
   </p:sldMasterIdLst>
   <p:notesMasterIdLst>
-    <p:notesMasterId r:id="rId10"/>
+    <p:notesMasterId r:id="rId11"/>
   </p:notesMasterIdLst>
   <p:sldIdLst>
     <p:sldId id="259" r:id="rId3"/>
@@ -16,6 +16,7 @@
     <p:sldId id="262" r:id="rId7"/>
     <p:sldId id="263" r:id="rId8"/>
     <p:sldId id="264" r:id="rId9"/>
+    <p:sldId id="265" r:id="rId10"/>
   </p:sldIdLst>
   <p:sldSz cx="12192000" cy="6858000"/>
   <p:notesSz cx="6858000" cy="9144000"/>
@@ -204,7 +205,7 @@
           <a:p>
             <a:fld id="{B8404A9E-F80D-47A3-9ABE-4E375F8C7A58}" type="datetimeFigureOut">
               <a:rPr lang="fr-CA" smtClean="0"/>
-              <a:t>2025-05-30</a:t>
+              <a:t>2025-07-05</a:t>
             </a:fld>
             <a:endParaRPr lang="fr-CA"/>
           </a:p>
@@ -621,7 +622,7 @@
           <a:p>
             <a:fld id="{B1B97C2F-ED53-40B2-8245-274A53568F1F}" type="datetimeFigureOut">
               <a:rPr lang="fr-CA" smtClean="0"/>
-              <a:t>2025-05-30</a:t>
+              <a:t>2025-07-05</a:t>
             </a:fld>
             <a:endParaRPr lang="fr-CA"/>
           </a:p>
@@ -821,7 +822,7 @@
           <a:p>
             <a:fld id="{B1B97C2F-ED53-40B2-8245-274A53568F1F}" type="datetimeFigureOut">
               <a:rPr lang="fr-CA" smtClean="0"/>
-              <a:t>2025-05-30</a:t>
+              <a:t>2025-07-05</a:t>
             </a:fld>
             <a:endParaRPr lang="fr-CA"/>
           </a:p>
@@ -1031,7 +1032,7 @@
           <a:p>
             <a:fld id="{B1B97C2F-ED53-40B2-8245-274A53568F1F}" type="datetimeFigureOut">
               <a:rPr lang="fr-CA" smtClean="0"/>
-              <a:t>2025-05-30</a:t>
+              <a:t>2025-07-05</a:t>
             </a:fld>
             <a:endParaRPr lang="fr-CA"/>
           </a:p>
@@ -1253,7 +1254,7 @@
           <a:p>
             <a:fld id="{3CFA78C3-2C03-4D26-BA08-5201FB292C09}" type="datetimeFigureOut">
               <a:rPr lang="fr-CA" smtClean="0"/>
-              <a:t>2025-05-30</a:t>
+              <a:t>2025-07-05</a:t>
             </a:fld>
             <a:endParaRPr lang="fr-CA"/>
           </a:p>
@@ -1453,7 +1454,7 @@
           <a:p>
             <a:fld id="{3CFA78C3-2C03-4D26-BA08-5201FB292C09}" type="datetimeFigureOut">
               <a:rPr lang="fr-CA" smtClean="0"/>
-              <a:t>2025-05-30</a:t>
+              <a:t>2025-07-05</a:t>
             </a:fld>
             <a:endParaRPr lang="fr-CA"/>
           </a:p>
@@ -1729,7 +1730,7 @@
           <a:p>
             <a:fld id="{3CFA78C3-2C03-4D26-BA08-5201FB292C09}" type="datetimeFigureOut">
               <a:rPr lang="fr-CA" smtClean="0"/>
-              <a:t>2025-05-30</a:t>
+              <a:t>2025-07-05</a:t>
             </a:fld>
             <a:endParaRPr lang="fr-CA"/>
           </a:p>
@@ -1997,7 +1998,7 @@
           <a:p>
             <a:fld id="{3CFA78C3-2C03-4D26-BA08-5201FB292C09}" type="datetimeFigureOut">
               <a:rPr lang="fr-CA" smtClean="0"/>
-              <a:t>2025-05-30</a:t>
+              <a:t>2025-07-05</a:t>
             </a:fld>
             <a:endParaRPr lang="fr-CA"/>
           </a:p>
@@ -2412,7 +2413,7 @@
           <a:p>
             <a:fld id="{3CFA78C3-2C03-4D26-BA08-5201FB292C09}" type="datetimeFigureOut">
               <a:rPr lang="fr-CA" smtClean="0"/>
-              <a:t>2025-05-30</a:t>
+              <a:t>2025-07-05</a:t>
             </a:fld>
             <a:endParaRPr lang="fr-CA"/>
           </a:p>
@@ -2554,7 +2555,7 @@
           <a:p>
             <a:fld id="{3CFA78C3-2C03-4D26-BA08-5201FB292C09}" type="datetimeFigureOut">
               <a:rPr lang="fr-CA" smtClean="0"/>
-              <a:t>2025-05-30</a:t>
+              <a:t>2025-07-05</a:t>
             </a:fld>
             <a:endParaRPr lang="fr-CA"/>
           </a:p>
@@ -2667,7 +2668,7 @@
           <a:p>
             <a:fld id="{3CFA78C3-2C03-4D26-BA08-5201FB292C09}" type="datetimeFigureOut">
               <a:rPr lang="fr-CA" smtClean="0"/>
-              <a:t>2025-05-30</a:t>
+              <a:t>2025-07-05</a:t>
             </a:fld>
             <a:endParaRPr lang="fr-CA"/>
           </a:p>
@@ -2980,7 +2981,7 @@
           <a:p>
             <a:fld id="{3CFA78C3-2C03-4D26-BA08-5201FB292C09}" type="datetimeFigureOut">
               <a:rPr lang="fr-CA" smtClean="0"/>
-              <a:t>2025-05-30</a:t>
+              <a:t>2025-07-05</a:t>
             </a:fld>
             <a:endParaRPr lang="fr-CA"/>
           </a:p>
@@ -3180,7 +3181,7 @@
           <a:p>
             <a:fld id="{B1B97C2F-ED53-40B2-8245-274A53568F1F}" type="datetimeFigureOut">
               <a:rPr lang="fr-CA" smtClean="0"/>
-              <a:t>2025-05-30</a:t>
+              <a:t>2025-07-05</a:t>
             </a:fld>
             <a:endParaRPr lang="fr-CA"/>
           </a:p>
@@ -3469,7 +3470,7 @@
           <a:p>
             <a:fld id="{3CFA78C3-2C03-4D26-BA08-5201FB292C09}" type="datetimeFigureOut">
               <a:rPr lang="fr-CA" smtClean="0"/>
-              <a:t>2025-05-30</a:t>
+              <a:t>2025-07-05</a:t>
             </a:fld>
             <a:endParaRPr lang="fr-CA"/>
           </a:p>
@@ -3669,7 +3670,7 @@
           <a:p>
             <a:fld id="{3CFA78C3-2C03-4D26-BA08-5201FB292C09}" type="datetimeFigureOut">
               <a:rPr lang="fr-CA" smtClean="0"/>
-              <a:t>2025-05-30</a:t>
+              <a:t>2025-07-05</a:t>
             </a:fld>
             <a:endParaRPr lang="fr-CA"/>
           </a:p>
@@ -3879,7 +3880,7 @@
           <a:p>
             <a:fld id="{3CFA78C3-2C03-4D26-BA08-5201FB292C09}" type="datetimeFigureOut">
               <a:rPr lang="fr-CA" smtClean="0"/>
-              <a:t>2025-05-30</a:t>
+              <a:t>2025-07-05</a:t>
             </a:fld>
             <a:endParaRPr lang="fr-CA"/>
           </a:p>
@@ -4155,7 +4156,7 @@
           <a:p>
             <a:fld id="{B1B97C2F-ED53-40B2-8245-274A53568F1F}" type="datetimeFigureOut">
               <a:rPr lang="fr-CA" smtClean="0"/>
-              <a:t>2025-05-30</a:t>
+              <a:t>2025-07-05</a:t>
             </a:fld>
             <a:endParaRPr lang="fr-CA"/>
           </a:p>
@@ -4423,7 +4424,7 @@
           <a:p>
             <a:fld id="{B1B97C2F-ED53-40B2-8245-274A53568F1F}" type="datetimeFigureOut">
               <a:rPr lang="fr-CA" smtClean="0"/>
-              <a:t>2025-05-30</a:t>
+              <a:t>2025-07-05</a:t>
             </a:fld>
             <a:endParaRPr lang="fr-CA"/>
           </a:p>
@@ -4838,7 +4839,7 @@
           <a:p>
             <a:fld id="{B1B97C2F-ED53-40B2-8245-274A53568F1F}" type="datetimeFigureOut">
               <a:rPr lang="fr-CA" smtClean="0"/>
-              <a:t>2025-05-30</a:t>
+              <a:t>2025-07-05</a:t>
             </a:fld>
             <a:endParaRPr lang="fr-CA"/>
           </a:p>
@@ -4980,7 +4981,7 @@
           <a:p>
             <a:fld id="{B1B97C2F-ED53-40B2-8245-274A53568F1F}" type="datetimeFigureOut">
               <a:rPr lang="fr-CA" smtClean="0"/>
-              <a:t>2025-05-30</a:t>
+              <a:t>2025-07-05</a:t>
             </a:fld>
             <a:endParaRPr lang="fr-CA"/>
           </a:p>
@@ -5093,7 +5094,7 @@
           <a:p>
             <a:fld id="{B1B97C2F-ED53-40B2-8245-274A53568F1F}" type="datetimeFigureOut">
               <a:rPr lang="fr-CA" smtClean="0"/>
-              <a:t>2025-05-30</a:t>
+              <a:t>2025-07-05</a:t>
             </a:fld>
             <a:endParaRPr lang="fr-CA"/>
           </a:p>
@@ -5406,7 +5407,7 @@
           <a:p>
             <a:fld id="{B1B97C2F-ED53-40B2-8245-274A53568F1F}" type="datetimeFigureOut">
               <a:rPr lang="fr-CA" smtClean="0"/>
-              <a:t>2025-05-30</a:t>
+              <a:t>2025-07-05</a:t>
             </a:fld>
             <a:endParaRPr lang="fr-CA"/>
           </a:p>
@@ -5695,7 +5696,7 @@
           <a:p>
             <a:fld id="{B1B97C2F-ED53-40B2-8245-274A53568F1F}" type="datetimeFigureOut">
               <a:rPr lang="fr-CA" smtClean="0"/>
-              <a:t>2025-05-30</a:t>
+              <a:t>2025-07-05</a:t>
             </a:fld>
             <a:endParaRPr lang="fr-CA"/>
           </a:p>
@@ -5938,7 +5939,7 @@
           <a:p>
             <a:fld id="{B1B97C2F-ED53-40B2-8245-274A53568F1F}" type="datetimeFigureOut">
               <a:rPr lang="fr-CA" smtClean="0"/>
-              <a:t>2025-05-30</a:t>
+              <a:t>2025-07-05</a:t>
             </a:fld>
             <a:endParaRPr lang="fr-CA"/>
           </a:p>
@@ -6508,7 +6509,7 @@
           <a:p>
             <a:fld id="{3CFA78C3-2C03-4D26-BA08-5201FB292C09}" type="datetimeFigureOut">
               <a:rPr lang="fr-CA" smtClean="0"/>
-              <a:t>2025-05-30</a:t>
+              <a:t>2025-07-05</a:t>
             </a:fld>
             <a:endParaRPr lang="fr-CA"/>
           </a:p>
@@ -16604,6 +16605,171 @@
     <p:extLst>
       <p:ext uri="{BB962C8B-B14F-4D97-AF65-F5344CB8AC3E}">
         <p14:creationId xmlns:p14="http://schemas.microsoft.com/office/powerpoint/2010/main" val="2956498523"/>
+      </p:ext>
+    </p:extLst>
+  </p:cSld>
+  <p:clrMapOvr>
+    <a:masterClrMapping/>
+  </p:clrMapOvr>
+</p:sld>
+</file>
+
+<file path=ppt/slides/slide8.xml><?xml version="1.0" encoding="utf-8"?>
+<p:sld xmlns:a="http://schemas.openxmlformats.org/drawingml/2006/main" xmlns:r="http://schemas.openxmlformats.org/officeDocument/2006/relationships" xmlns:p="http://schemas.openxmlformats.org/presentationml/2006/main">
+  <p:cSld>
+    <p:spTree>
+      <p:nvGrpSpPr>
+        <p:cNvPr id="1" name=""/>
+        <p:cNvGrpSpPr/>
+        <p:nvPr/>
+      </p:nvGrpSpPr>
+      <p:grpSpPr>
+        <a:xfrm>
+          <a:off x="0" y="0"/>
+          <a:ext cx="0" cy="0"/>
+          <a:chOff x="0" y="0"/>
+          <a:chExt cx="0" cy="0"/>
+        </a:xfrm>
+      </p:grpSpPr>
+      <p:grpSp>
+        <p:nvGrpSpPr>
+          <p:cNvPr id="19" name="Groupe 18">
+            <a:extLst>
+              <a:ext uri="{FF2B5EF4-FFF2-40B4-BE49-F238E27FC236}">
+                <a16:creationId xmlns:a16="http://schemas.microsoft.com/office/drawing/2014/main" id="{9349F811-D107-1F39-767D-C8A98088D159}"/>
+              </a:ext>
+            </a:extLst>
+          </p:cNvPr>
+          <p:cNvGrpSpPr/>
+          <p:nvPr/>
+        </p:nvGrpSpPr>
+        <p:grpSpPr>
+          <a:xfrm>
+            <a:off x="1137920" y="477520"/>
+            <a:ext cx="2311400" cy="2783840"/>
+            <a:chOff x="1137920" y="477520"/>
+            <a:chExt cx="2311400" cy="2783840"/>
+          </a:xfrm>
+        </p:grpSpPr>
+        <p:sp>
+          <p:nvSpPr>
+            <p:cNvPr id="4" name="Rectangle : coins arrondis 3">
+              <a:extLst>
+                <a:ext uri="{FF2B5EF4-FFF2-40B4-BE49-F238E27FC236}">
+                  <a16:creationId xmlns:a16="http://schemas.microsoft.com/office/drawing/2014/main" id="{14177AF7-95A5-BCBF-B2E7-581F23DAC846}"/>
+                </a:ext>
+              </a:extLst>
+            </p:cNvPr>
+            <p:cNvSpPr/>
+            <p:nvPr/>
+          </p:nvSpPr>
+          <p:spPr>
+            <a:xfrm>
+              <a:off x="1732280" y="477520"/>
+              <a:ext cx="1717040" cy="2255520"/>
+            </a:xfrm>
+            <a:prstGeom prst="roundRect">
+              <a:avLst>
+                <a:gd name="adj" fmla="val 3649"/>
+              </a:avLst>
+            </a:prstGeom>
+            <a:solidFill>
+              <a:schemeClr val="bg1">
+                <a:lumMod val="95000"/>
+              </a:schemeClr>
+            </a:solidFill>
+            <a:ln w="203200">
+              <a:solidFill>
+                <a:schemeClr val="tx1"/>
+              </a:solidFill>
+            </a:ln>
+          </p:spPr>
+          <p:style>
+            <a:lnRef idx="2">
+              <a:schemeClr val="accent1">
+                <a:shade val="15000"/>
+              </a:schemeClr>
+            </a:lnRef>
+            <a:fillRef idx="1">
+              <a:schemeClr val="accent1"/>
+            </a:fillRef>
+            <a:effectRef idx="0">
+              <a:schemeClr val="accent1"/>
+            </a:effectRef>
+            <a:fontRef idx="minor">
+              <a:schemeClr val="lt1"/>
+            </a:fontRef>
+          </p:style>
+          <p:txBody>
+            <a:bodyPr rtlCol="0" anchor="ctr"/>
+            <a:lstStyle/>
+            <a:p>
+              <a:pPr algn="ctr"/>
+              <a:endParaRPr lang="fr-CA"/>
+            </a:p>
+          </p:txBody>
+        </p:sp>
+        <p:sp>
+          <p:nvSpPr>
+            <p:cNvPr id="5" name="Rectangle : coins arrondis 4">
+              <a:extLst>
+                <a:ext uri="{FF2B5EF4-FFF2-40B4-BE49-F238E27FC236}">
+                  <a16:creationId xmlns:a16="http://schemas.microsoft.com/office/drawing/2014/main" id="{19288E8E-A857-EFC9-39A7-242A899E3606}"/>
+                </a:ext>
+              </a:extLst>
+            </p:cNvPr>
+            <p:cNvSpPr/>
+            <p:nvPr/>
+          </p:nvSpPr>
+          <p:spPr>
+            <a:xfrm>
+              <a:off x="1137920" y="1005840"/>
+              <a:ext cx="1717040" cy="2255520"/>
+            </a:xfrm>
+            <a:prstGeom prst="roundRect">
+              <a:avLst>
+                <a:gd name="adj" fmla="val 3649"/>
+              </a:avLst>
+            </a:prstGeom>
+            <a:solidFill>
+              <a:schemeClr val="bg1"/>
+            </a:solidFill>
+            <a:ln w="203200">
+              <a:solidFill>
+                <a:schemeClr val="tx1"/>
+              </a:solidFill>
+            </a:ln>
+          </p:spPr>
+          <p:style>
+            <a:lnRef idx="2">
+              <a:schemeClr val="accent1">
+                <a:shade val="15000"/>
+              </a:schemeClr>
+            </a:lnRef>
+            <a:fillRef idx="1">
+              <a:schemeClr val="accent1"/>
+            </a:fillRef>
+            <a:effectRef idx="0">
+              <a:schemeClr val="accent1"/>
+            </a:effectRef>
+            <a:fontRef idx="minor">
+              <a:schemeClr val="lt1"/>
+            </a:fontRef>
+          </p:style>
+          <p:txBody>
+            <a:bodyPr rtlCol="0" anchor="ctr"/>
+            <a:lstStyle/>
+            <a:p>
+              <a:pPr algn="ctr"/>
+              <a:endParaRPr lang="fr-CA"/>
+            </a:p>
+          </p:txBody>
+        </p:sp>
+      </p:grpSp>
+    </p:spTree>
+    <p:extLst>
+      <p:ext uri="{BB962C8B-B14F-4D97-AF65-F5344CB8AC3E}">
+        <p14:creationId xmlns:p14="http://schemas.microsoft.com/office/powerpoint/2010/main" val="3550470372"/>
       </p:ext>
     </p:extLst>
   </p:cSld>

</xml_diff>